<commit_message>
update Programming Basics tutorial
</commit_message>
<xml_diff>
--- a/Programming Basics/Presentation/Program Flow Control.pptx
+++ b/Programming Basics/Presentation/Program Flow Control.pptx
@@ -5,7 +5,7 @@
     <p:sldMasterId id="2147483709" r:id="rId1"/>
   </p:sldMasterIdLst>
   <p:notesMasterIdLst>
-    <p:notesMasterId r:id="rId21"/>
+    <p:notesMasterId r:id="rId20"/>
   </p:notesMasterIdLst>
   <p:sldIdLst>
     <p:sldId id="320" r:id="rId2"/>
@@ -21,12 +21,11 @@
     <p:sldId id="270" r:id="rId12"/>
     <p:sldId id="271" r:id="rId13"/>
     <p:sldId id="272" r:id="rId14"/>
-    <p:sldId id="273" r:id="rId15"/>
-    <p:sldId id="274" r:id="rId16"/>
-    <p:sldId id="275" r:id="rId17"/>
-    <p:sldId id="276" r:id="rId18"/>
-    <p:sldId id="277" r:id="rId19"/>
-    <p:sldId id="278" r:id="rId20"/>
+    <p:sldId id="274" r:id="rId15"/>
+    <p:sldId id="275" r:id="rId16"/>
+    <p:sldId id="276" r:id="rId17"/>
+    <p:sldId id="277" r:id="rId18"/>
+    <p:sldId id="278" r:id="rId19"/>
   </p:sldIdLst>
   <p:sldSz cx="9144000" cy="6858000" type="screen4x3"/>
   <p:notesSz cx="6858000" cy="9144000"/>
@@ -226,7 +225,7 @@
           <a:p>
             <a:fld id="{D7492970-DFEC-9C47-BA83-F3D32BFB63B2}" type="datetimeFigureOut">
               <a:rPr lang="en-US" smtClean="0"/>
-              <a:t>9/18/22</a:t>
+              <a:t>9/19/22</a:t>
             </a:fld>
             <a:endParaRPr lang="en-US"/>
           </a:p>
@@ -5590,10 +5589,10 @@
       </p:grpSpPr>
       <p:sp>
         <p:nvSpPr>
-          <p:cNvPr id="32770" name="Rectangle 2">
+          <p:cNvPr id="33794" name="Rectangle 2">
             <a:extLst>
               <a:ext uri="{FF2B5EF4-FFF2-40B4-BE49-F238E27FC236}">
-                <a16:creationId xmlns:a16="http://schemas.microsoft.com/office/drawing/2014/main" id="{DFC7FE4F-168D-E1C2-785C-7A15C83F24DF}"/>
+                <a16:creationId xmlns:a16="http://schemas.microsoft.com/office/drawing/2014/main" id="{AA03CDF4-12F6-A8D9-F604-1A374F4A1845}"/>
               </a:ext>
             </a:extLst>
           </p:cNvPr>
@@ -5624,7 +5623,7 @@
                 </a:solidFill>
                 <a:latin typeface="Calibri" panose="020F0502020204030204" pitchFamily="34" charset="0"/>
               </a:rPr>
-              <a:t>break</a:t>
+              <a:t>switch</a:t>
             </a:r>
             <a:r>
               <a:rPr lang="en-US" altLang="en-US" dirty="0">
@@ -5637,10 +5636,10 @@
       </p:sp>
       <p:sp>
         <p:nvSpPr>
-          <p:cNvPr id="32771" name="Rectangle 3">
+          <p:cNvPr id="33795" name="Rectangle 3">
             <a:extLst>
               <a:ext uri="{FF2B5EF4-FFF2-40B4-BE49-F238E27FC236}">
-                <a16:creationId xmlns:a16="http://schemas.microsoft.com/office/drawing/2014/main" id="{3A1DDD64-14FA-FAB5-84E6-56F6BA03F822}"/>
+                <a16:creationId xmlns:a16="http://schemas.microsoft.com/office/drawing/2014/main" id="{99AC8175-FDA0-E946-9CD8-5FA0A519C821}"/>
               </a:ext>
             </a:extLst>
           </p:cNvPr>
@@ -5664,16 +5663,18 @@
             </a:pPr>
             <a:r>
               <a:rPr lang="en-US" altLang="en-US" dirty="0">
+                <a:solidFill>
+                  <a:schemeClr val="accent2"/>
+                </a:solidFill>
                 <a:latin typeface="Calibri" panose="020F0502020204030204" pitchFamily="34" charset="0"/>
               </a:rPr>
-              <a:t>Inside any loop, the break statement will immediately get you out of the loop</a:t>
-            </a:r>
-          </a:p>
-          <a:p>
-            <a:pPr lvl="1"/>
-            <a:r>
-              <a:rPr lang="en-US" altLang="en-US" dirty="0"/>
-              <a:t>If you are in nested loops, break gets you out of the innermost loop</a:t>
+              <a:t>Switch</a:t>
+            </a:r>
+            <a:r>
+              <a:rPr lang="en-US" altLang="en-US" dirty="0">
+                <a:latin typeface="Calibri" panose="020F0502020204030204" pitchFamily="34" charset="0"/>
+              </a:rPr>
+              <a:t> is Multi-way decisions control statement</a:t>
             </a:r>
           </a:p>
           <a:p>
@@ -5685,99 +5686,7 @@
               <a:rPr lang="en-US" altLang="en-US" dirty="0">
                 <a:latin typeface="Calibri" panose="020F0502020204030204" pitchFamily="34" charset="0"/>
               </a:rPr>
-              <a:t>It doesn’t make any sense to break out of a loop unconditionally—you should do it only as the result of an if test</a:t>
-            </a:r>
-          </a:p>
-          <a:p>
-            <a:pPr>
-              <a:buFont typeface="Courier New" panose="02070309020205020404" pitchFamily="49" charset="0"/>
-              <a:buChar char="o"/>
-            </a:pPr>
-            <a:r>
-              <a:rPr lang="en-US" altLang="en-US" dirty="0">
-                <a:latin typeface="Calibri" panose="020F0502020204030204" pitchFamily="34" charset="0"/>
-              </a:rPr>
-              <a:t>Example:</a:t>
-            </a:r>
-          </a:p>
-          <a:p>
-            <a:pPr lvl="1"/>
-            <a:r>
-              <a:rPr lang="en-US" altLang="en-US" dirty="0"/>
-              <a:t>for (int </a:t>
-            </a:r>
-            <a:r>
-              <a:rPr lang="en-US" altLang="en-US" dirty="0" err="1"/>
-              <a:t>i</a:t>
-            </a:r>
-            <a:r>
-              <a:rPr lang="en-US" altLang="en-US" dirty="0"/>
-              <a:t> = 1; </a:t>
-            </a:r>
-            <a:r>
-              <a:rPr lang="en-US" altLang="en-US" dirty="0" err="1"/>
-              <a:t>i</a:t>
-            </a:r>
-            <a:r>
-              <a:rPr lang="en-US" altLang="en-US" dirty="0"/>
-              <a:t> &lt;= 12; </a:t>
-            </a:r>
-            <a:r>
-              <a:rPr lang="en-US" altLang="en-US" dirty="0" err="1"/>
-              <a:t>i</a:t>
-            </a:r>
-            <a:r>
-              <a:rPr lang="en-US" altLang="en-US" dirty="0"/>
-              <a:t>++) {</a:t>
-            </a:r>
-            <a:br>
-              <a:rPr lang="en-US" altLang="en-US" dirty="0"/>
-            </a:br>
-            <a:r>
-              <a:rPr lang="en-US" altLang="en-US" dirty="0"/>
-              <a:t>    if (</a:t>
-            </a:r>
-            <a:r>
-              <a:rPr lang="en-US" altLang="en-US" dirty="0" err="1"/>
-              <a:t>badEgg</a:t>
-            </a:r>
-            <a:r>
-              <a:rPr lang="en-US" altLang="en-US" dirty="0"/>
-              <a:t>(</a:t>
-            </a:r>
-            <a:r>
-              <a:rPr lang="en-US" altLang="en-US" dirty="0" err="1"/>
-              <a:t>i</a:t>
-            </a:r>
-            <a:r>
-              <a:rPr lang="en-US" altLang="en-US" dirty="0"/>
-              <a:t>)) break;</a:t>
-            </a:r>
-            <a:br>
-              <a:rPr lang="en-US" altLang="en-US" dirty="0"/>
-            </a:br>
-            <a:r>
-              <a:rPr lang="en-US" altLang="en-US" dirty="0"/>
-              <a:t>}        </a:t>
-            </a:r>
-          </a:p>
-          <a:p>
-            <a:pPr>
-              <a:buFont typeface="Courier New" panose="02070309020205020404" pitchFamily="49" charset="0"/>
-              <a:buChar char="o"/>
-            </a:pPr>
-            <a:r>
-              <a:rPr lang="en-US" altLang="en-US" dirty="0">
-                <a:latin typeface="Calibri" panose="020F0502020204030204" pitchFamily="34" charset="0"/>
-              </a:rPr>
-              <a:t>break is not the normal way to leave a loop</a:t>
-            </a:r>
-          </a:p>
-          <a:p>
-            <a:pPr lvl="1"/>
-            <a:r>
-              <a:rPr lang="en-US" altLang="en-US" dirty="0"/>
-              <a:t>Use it when necessary, but don’t overuse it</a:t>
+              <a:t>The switch statement chooses one of several statements, based on the value on an integer (int, byte, short, or long) or a char expression</a:t>
             </a:r>
           </a:p>
           <a:p>
@@ -5796,7 +5705,7 @@
           <p:cNvPr id="2" name="Footer Placeholder 1">
             <a:extLst>
               <a:ext uri="{FF2B5EF4-FFF2-40B4-BE49-F238E27FC236}">
-                <a16:creationId xmlns:a16="http://schemas.microsoft.com/office/drawing/2014/main" id="{2BCC274E-E036-B07A-2EEB-D7587551DC58}"/>
+                <a16:creationId xmlns:a16="http://schemas.microsoft.com/office/drawing/2014/main" id="{5EA32C45-C236-34C0-430F-136B93C49ACF}"/>
               </a:ext>
             </a:extLst>
           </p:cNvPr>
@@ -5846,172 +5755,6 @@
       </p:grpSpPr>
       <p:sp>
         <p:nvSpPr>
-          <p:cNvPr id="33794" name="Rectangle 2">
-            <a:extLst>
-              <a:ext uri="{FF2B5EF4-FFF2-40B4-BE49-F238E27FC236}">
-                <a16:creationId xmlns:a16="http://schemas.microsoft.com/office/drawing/2014/main" id="{AA03CDF4-12F6-A8D9-F604-1A374F4A1845}"/>
-              </a:ext>
-            </a:extLst>
-          </p:cNvPr>
-          <p:cNvSpPr>
-            <a:spLocks noGrp="1" noRot="1" noChangeArrowheads="1"/>
-          </p:cNvSpPr>
-          <p:nvPr>
-            <p:ph type="title"/>
-          </p:nvPr>
-        </p:nvSpPr>
-        <p:spPr/>
-        <p:txBody>
-          <a:bodyPr vert="horz" lIns="91440" tIns="45720" rIns="91440" bIns="45720" rtlCol="0" anchor="ctr">
-            <a:normAutofit/>
-          </a:bodyPr>
-          <a:lstStyle/>
-          <a:p>
-            <a:r>
-              <a:rPr lang="en-US" altLang="en-US" dirty="0">
-                <a:latin typeface="Calibri" panose="020F0502020204030204" pitchFamily="34" charset="0"/>
-              </a:rPr>
-              <a:t>The </a:t>
-            </a:r>
-            <a:r>
-              <a:rPr lang="en-US" altLang="en-US" dirty="0">
-                <a:solidFill>
-                  <a:schemeClr val="accent2"/>
-                </a:solidFill>
-                <a:latin typeface="Calibri" panose="020F0502020204030204" pitchFamily="34" charset="0"/>
-              </a:rPr>
-              <a:t>switch</a:t>
-            </a:r>
-            <a:r>
-              <a:rPr lang="en-US" altLang="en-US" dirty="0">
-                <a:latin typeface="Calibri" panose="020F0502020204030204" pitchFamily="34" charset="0"/>
-              </a:rPr>
-              <a:t> statement</a:t>
-            </a:r>
-          </a:p>
-        </p:txBody>
-      </p:sp>
-      <p:sp>
-        <p:nvSpPr>
-          <p:cNvPr id="33795" name="Rectangle 3">
-            <a:extLst>
-              <a:ext uri="{FF2B5EF4-FFF2-40B4-BE49-F238E27FC236}">
-                <a16:creationId xmlns:a16="http://schemas.microsoft.com/office/drawing/2014/main" id="{99AC8175-FDA0-E946-9CD8-5FA0A519C821}"/>
-              </a:ext>
-            </a:extLst>
-          </p:cNvPr>
-          <p:cNvSpPr>
-            <a:spLocks noGrp="1" noChangeArrowheads="1"/>
-          </p:cNvSpPr>
-          <p:nvPr>
-            <p:ph idx="1"/>
-          </p:nvPr>
-        </p:nvSpPr>
-        <p:spPr/>
-        <p:txBody>
-          <a:bodyPr vert="horz" lIns="45720" tIns="45720" rIns="45720" bIns="45720" rtlCol="0">
-            <a:normAutofit/>
-          </a:bodyPr>
-          <a:lstStyle/>
-          <a:p>
-            <a:pPr>
-              <a:buFont typeface="Courier New" panose="02070309020205020404" pitchFamily="49" charset="0"/>
-              <a:buChar char="o"/>
-            </a:pPr>
-            <a:r>
-              <a:rPr lang="en-US" altLang="en-US" dirty="0">
-                <a:solidFill>
-                  <a:schemeClr val="accent2"/>
-                </a:solidFill>
-                <a:latin typeface="Calibri" panose="020F0502020204030204" pitchFamily="34" charset="0"/>
-              </a:rPr>
-              <a:t>Switch</a:t>
-            </a:r>
-            <a:r>
-              <a:rPr lang="en-US" altLang="en-US" dirty="0">
-                <a:latin typeface="Calibri" panose="020F0502020204030204" pitchFamily="34" charset="0"/>
-              </a:rPr>
-              <a:t> is Multi-way decisions control statement</a:t>
-            </a:r>
-          </a:p>
-          <a:p>
-            <a:pPr>
-              <a:buFont typeface="Courier New" panose="02070309020205020404" pitchFamily="49" charset="0"/>
-              <a:buChar char="o"/>
-            </a:pPr>
-            <a:r>
-              <a:rPr lang="en-US" altLang="en-US" dirty="0">
-                <a:latin typeface="Calibri" panose="020F0502020204030204" pitchFamily="34" charset="0"/>
-              </a:rPr>
-              <a:t>The switch statement chooses one of several statements, based on the value on an integer (int, byte, short, or long) or a char expression</a:t>
-            </a:r>
-          </a:p>
-          <a:p>
-            <a:pPr>
-              <a:buFont typeface="Courier New" panose="02070309020205020404" pitchFamily="49" charset="0"/>
-              <a:buChar char="o"/>
-            </a:pPr>
-            <a:endParaRPr lang="en-US" altLang="en-US" dirty="0">
-              <a:latin typeface="Calibri" panose="020F0502020204030204" pitchFamily="34" charset="0"/>
-            </a:endParaRPr>
-          </a:p>
-        </p:txBody>
-      </p:sp>
-      <p:sp>
-        <p:nvSpPr>
-          <p:cNvPr id="2" name="Footer Placeholder 1">
-            <a:extLst>
-              <a:ext uri="{FF2B5EF4-FFF2-40B4-BE49-F238E27FC236}">
-                <a16:creationId xmlns:a16="http://schemas.microsoft.com/office/drawing/2014/main" id="{5EA32C45-C236-34C0-430F-136B93C49ACF}"/>
-              </a:ext>
-            </a:extLst>
-          </p:cNvPr>
-          <p:cNvSpPr>
-            <a:spLocks noGrp="1"/>
-          </p:cNvSpPr>
-          <p:nvPr>
-            <p:ph type="ftr" sz="quarter" idx="11"/>
-          </p:nvPr>
-        </p:nvSpPr>
-        <p:spPr/>
-        <p:txBody>
-          <a:bodyPr/>
-          <a:lstStyle/>
-          <a:p>
-            <a:r>
-              <a:rPr lang="en-US" altLang="en-US"/>
-              <a:t>YETANOTHERMASTERYLEARNING</a:t>
-            </a:r>
-          </a:p>
-        </p:txBody>
-      </p:sp>
-    </p:spTree>
-  </p:cSld>
-  <p:clrMapOvr>
-    <a:masterClrMapping/>
-  </p:clrMapOvr>
-</p:sld>
-</file>
-
-<file path=ppt/slides/slide16.xml><?xml version="1.0" encoding="utf-8"?>
-<p:sld xmlns:a="http://schemas.openxmlformats.org/drawingml/2006/main" xmlns:r="http://schemas.openxmlformats.org/officeDocument/2006/relationships" xmlns:p="http://schemas.openxmlformats.org/presentationml/2006/main" showMasterPhAnim="0">
-  <p:cSld>
-    <p:spTree>
-      <p:nvGrpSpPr>
-        <p:cNvPr id="1" name=""/>
-        <p:cNvGrpSpPr/>
-        <p:nvPr/>
-      </p:nvGrpSpPr>
-      <p:grpSpPr>
-        <a:xfrm>
-          <a:off x="0" y="0"/>
-          <a:ext cx="0" cy="0"/>
-          <a:chOff x="0" y="0"/>
-          <a:chExt cx="0" cy="0"/>
-        </a:xfrm>
-      </p:grpSpPr>
-      <p:sp>
-        <p:nvSpPr>
           <p:cNvPr id="34818" name="Rectangle 2">
             <a:extLst>
               <a:ext uri="{FF2B5EF4-FFF2-40B4-BE49-F238E27FC236}">
@@ -6448,7 +6191,7 @@
 </p:sld>
 </file>
 
-<file path=ppt/slides/slide17.xml><?xml version="1.0" encoding="utf-8"?>
+<file path=ppt/slides/slide16.xml><?xml version="1.0" encoding="utf-8"?>
 <p:sld xmlns:a="http://schemas.openxmlformats.org/drawingml/2006/main" xmlns:r="http://schemas.openxmlformats.org/officeDocument/2006/relationships" xmlns:p="http://schemas.openxmlformats.org/presentationml/2006/main" showMasterPhAnim="0">
   <p:cSld>
     <p:spTree>
@@ -8050,7 +7793,7 @@
 </p:sld>
 </file>
 
-<file path=ppt/slides/slide18.xml><?xml version="1.0" encoding="utf-8"?>
+<file path=ppt/slides/slide17.xml><?xml version="1.0" encoding="utf-8"?>
 <p:sld xmlns:a="http://schemas.openxmlformats.org/drawingml/2006/main" xmlns:r="http://schemas.openxmlformats.org/officeDocument/2006/relationships" xmlns:p="http://schemas.openxmlformats.org/presentationml/2006/main" showMasterPhAnim="0">
   <p:cSld>
     <p:spTree>
@@ -9948,7 +9691,7 @@
 </p:sld>
 </file>
 
-<file path=ppt/slides/slide19.xml><?xml version="1.0" encoding="utf-8"?>
+<file path=ppt/slides/slide18.xml><?xml version="1.0" encoding="utf-8"?>
 <p:sld xmlns:a="http://schemas.openxmlformats.org/drawingml/2006/main" xmlns:r="http://schemas.openxmlformats.org/officeDocument/2006/relationships" xmlns:p="http://schemas.openxmlformats.org/presentationml/2006/main" showMasterPhAnim="0">
   <p:cSld>
     <p:spTree>

</xml_diff>